<commit_message>
tiny changes to slides
</commit_message>
<xml_diff>
--- a/slides.pptx
+++ b/slides.pptx
@@ -17915,7 +17915,7 @@
           <a:p>
             <a:r>
               <a:rPr lang="en-US" dirty="0"/>
-              <a:t>Feature correlations and importance:</a:t>
+              <a:t>Feature correlation with fire size and feature importance:</a:t>
             </a:r>
           </a:p>
         </p:txBody>
@@ -17935,7 +17935,7 @@
           <p:nvPr>
             <p:extLst>
               <p:ext uri="{D42A27DB-BD31-4B8C-83A1-F6EECF244321}">
-                <p14:modId xmlns:p14="http://schemas.microsoft.com/office/powerpoint/2010/main" val="1558375636"/>
+                <p14:modId xmlns:p14="http://schemas.microsoft.com/office/powerpoint/2010/main" val="1976697278"/>
               </p:ext>
             </p:extLst>
           </p:nvPr>
@@ -18174,7 +18174,7 @@
                     <a:p>
                       <a:pPr algn="ctr"/>
                       <a:r>
-                        <a:rPr lang="en-US" sz="1400" dirty="0"/>
+                        <a:rPr lang="en-US" sz="1400" b="1" dirty="0"/>
                         <a:t>lightning</a:t>
                       </a:r>
                     </a:p>
@@ -18211,7 +18211,7 @@
                     <a:p>
                       <a:pPr algn="ctr"/>
                       <a:r>
-                        <a:rPr lang="en-US" sz="1400" kern="1200" dirty="0">
+                        <a:rPr lang="en-US" sz="1400" b="1" kern="1200" dirty="0">
                           <a:solidFill>
                             <a:schemeClr val="dk1"/>
                           </a:solidFill>
@@ -18222,7 +18222,7 @@
                         </a:rPr>
                         <a:t>rh</a:t>
                       </a:r>
-                      <a:endParaRPr lang="en-US" sz="1400" dirty="0"/>
+                      <a:endParaRPr lang="en-US" sz="1400" b="1" dirty="0"/>
                     </a:p>
                   </a:txBody>
                   <a:tcPr anchor="ctr"/>
@@ -18257,7 +18257,7 @@
                     <a:p>
                       <a:pPr algn="ctr"/>
                       <a:r>
-                        <a:rPr lang="en-US" sz="1400" kern="1200" dirty="0">
+                        <a:rPr lang="en-US" sz="1400" b="1" kern="1200" dirty="0">
                           <a:solidFill>
                             <a:schemeClr val="dk1"/>
                           </a:solidFill>
@@ -18268,7 +18268,7 @@
                         </a:rPr>
                         <a:t>FL</a:t>
                       </a:r>
-                      <a:endParaRPr lang="en-US" sz="1400" dirty="0"/>
+                      <a:endParaRPr lang="en-US" sz="1400" b="1" dirty="0"/>
                     </a:p>
                   </a:txBody>
                   <a:tcPr anchor="ctr"/>
@@ -18294,7 +18294,7 @@
                     <a:p>
                       <a:pPr algn="ctr"/>
                       <a:r>
-                        <a:rPr lang="en-US" sz="1400" dirty="0"/>
+                        <a:rPr lang="en-US" sz="1400" b="1" dirty="0"/>
                         <a:t>campfire</a:t>
                       </a:r>
                     </a:p>
@@ -18329,7 +18329,7 @@
                     <a:p>
                       <a:pPr algn="ctr"/>
                       <a:r>
-                        <a:rPr lang="en-US" sz="1400" dirty="0"/>
+                        <a:rPr lang="en-US" sz="1400" b="1" dirty="0"/>
                         <a:t>ID</a:t>
                       </a:r>
                     </a:p>
@@ -18366,7 +18366,7 @@
                     <a:p>
                       <a:pPr algn="ctr"/>
                       <a:r>
-                        <a:rPr lang="en-US" sz="1400" kern="1200" dirty="0">
+                        <a:rPr lang="en-US" sz="1400" b="1" kern="1200" dirty="0">
                           <a:solidFill>
                             <a:schemeClr val="dk1"/>
                           </a:solidFill>
@@ -18377,7 +18377,7 @@
                         </a:rPr>
                         <a:t>debris burning</a:t>
                       </a:r>
-                      <a:endParaRPr lang="en-US" sz="1400" dirty="0"/>
+                      <a:endParaRPr lang="en-US" sz="1400" b="1" dirty="0"/>
                     </a:p>
                   </a:txBody>
                   <a:tcPr anchor="ctr"/>
@@ -18412,7 +18412,7 @@
                     <a:p>
                       <a:pPr algn="ctr"/>
                       <a:r>
-                        <a:rPr lang="en-US" sz="1400" kern="1200" dirty="0">
+                        <a:rPr lang="en-US" sz="1400" b="1" kern="1200" dirty="0">
                           <a:solidFill>
                             <a:schemeClr val="dk1"/>
                           </a:solidFill>
@@ -18423,7 +18423,7 @@
                         </a:rPr>
                         <a:t>campfire</a:t>
                       </a:r>
-                      <a:endParaRPr lang="en-US" sz="1400" dirty="0"/>
+                      <a:endParaRPr lang="en-US" sz="1400" b="1" dirty="0"/>
                     </a:p>
                   </a:txBody>
                   <a:tcPr anchor="ctr"/>
@@ -18449,7 +18449,7 @@
                     <a:p>
                       <a:pPr algn="ctr"/>
                       <a:r>
-                        <a:rPr lang="en-US" sz="1400" dirty="0"/>
+                        <a:rPr lang="en-US" sz="1400" b="1" dirty="0"/>
                         <a:t>y2008</a:t>
                       </a:r>
                     </a:p>
@@ -18484,10 +18484,10 @@
                     <a:p>
                       <a:pPr algn="ctr"/>
                       <a:r>
-                        <a:rPr lang="en-US" sz="1400" dirty="0" err="1"/>
+                        <a:rPr lang="en-US" sz="1400" b="1" dirty="0" err="1"/>
                         <a:t>sc</a:t>
                       </a:r>
-                      <a:endParaRPr lang="en-US" sz="1400" dirty="0"/>
+                      <a:endParaRPr lang="en-US" sz="1400" b="1" dirty="0"/>
                     </a:p>
                   </a:txBody>
                   <a:tcPr anchor="ctr"/>
@@ -18513,7 +18513,7 @@
                     <a:p>
                       <a:pPr algn="ctr"/>
                       <a:r>
-                        <a:rPr lang="en-US" sz="1400" dirty="0"/>
+                        <a:rPr lang="en-US" sz="1400" b="1" dirty="0"/>
                         <a:t>CA</a:t>
                       </a:r>
                     </a:p>
@@ -18541,7 +18541,7 @@
                     <a:p>
                       <a:pPr algn="ctr"/>
                       <a:r>
-                        <a:rPr lang="en-US" sz="1400" dirty="0"/>
+                        <a:rPr lang="en-US" sz="1400" b="1" dirty="0"/>
                         <a:t>SC</a:t>
                       </a:r>
                     </a:p>
@@ -18569,7 +18569,7 @@
                     <a:p>
                       <a:pPr algn="ctr"/>
                       <a:r>
-                        <a:rPr lang="en-US" sz="1400" dirty="0"/>
+                        <a:rPr lang="en-US" sz="1400" b="1" dirty="0"/>
                         <a:t>lightning</a:t>
                       </a:r>
                     </a:p>
@@ -18604,10 +18604,10 @@
                     <a:p>
                       <a:pPr algn="ctr"/>
                       <a:r>
-                        <a:rPr lang="en-US" sz="1400" dirty="0" err="1"/>
+                        <a:rPr lang="en-US" sz="1400" b="1" dirty="0" err="1"/>
                         <a:t>tmp</a:t>
                       </a:r>
-                      <a:endParaRPr lang="en-US" sz="1400" dirty="0"/>
+                      <a:endParaRPr lang="en-US" sz="1400" b="1" dirty="0"/>
                     </a:p>
                   </a:txBody>
                   <a:tcPr anchor="ctr"/>
@@ -18633,7 +18633,7 @@
                     <a:p>
                       <a:pPr algn="ctr"/>
                       <a:r>
-                        <a:rPr lang="en-US" sz="1400" dirty="0"/>
+                        <a:rPr lang="en-US" sz="1400" b="1" dirty="0"/>
                         <a:t>NC</a:t>
                       </a:r>
                     </a:p>
@@ -18661,7 +18661,7 @@
                     <a:p>
                       <a:pPr algn="ctr"/>
                       <a:r>
-                        <a:rPr lang="en-US" sz="1400" dirty="0"/>
+                        <a:rPr lang="en-US" sz="1400" b="1" dirty="0"/>
                         <a:t>lightning</a:t>
                       </a:r>
                     </a:p>
@@ -18689,7 +18689,7 @@
                     <a:p>
                       <a:pPr algn="ctr"/>
                       <a:r>
-                        <a:rPr lang="en-US" sz="1400" dirty="0"/>
+                        <a:rPr lang="en-US" sz="1400" b="1" dirty="0"/>
                         <a:t>y2015</a:t>
                       </a:r>
                     </a:p>
@@ -18724,7 +18724,7 @@
                     <a:p>
                       <a:pPr algn="ctr"/>
                       <a:r>
-                        <a:rPr lang="en-US" sz="1400" dirty="0"/>
+                        <a:rPr lang="en-US" sz="1400" b="1" dirty="0"/>
                         <a:t>wind</a:t>
                       </a:r>
                     </a:p>
@@ -18752,7 +18752,7 @@
                     <a:p>
                       <a:pPr algn="ctr"/>
                       <a:r>
-                        <a:rPr lang="en-US" sz="1400" dirty="0"/>
+                        <a:rPr lang="en-US" sz="1400" b="1" dirty="0"/>
                         <a:t>urban</a:t>
                       </a:r>
                     </a:p>
@@ -18780,7 +18780,7 @@
                     <a:p>
                       <a:pPr algn="ctr"/>
                       <a:r>
-                        <a:rPr lang="en-US" sz="1400" dirty="0"/>
+                        <a:rPr lang="en-US" sz="1400" b="1" dirty="0"/>
                         <a:t>CO</a:t>
                       </a:r>
                     </a:p>
@@ -18808,7 +18808,7 @@
                     <a:p>
                       <a:pPr algn="ctr"/>
                       <a:r>
-                        <a:rPr lang="en-US" sz="1400" dirty="0"/>
+                        <a:rPr lang="en-US" sz="1400" b="1" dirty="0"/>
                         <a:t>woodland</a:t>
                       </a:r>
                     </a:p>
@@ -18843,7 +18843,7 @@
                     <a:p>
                       <a:pPr algn="ctr"/>
                       <a:r>
-                        <a:rPr lang="en-US" sz="1400" dirty="0"/>
+                        <a:rPr lang="en-US" sz="1400" b="1" dirty="0"/>
                         <a:t>grassland</a:t>
                       </a:r>
                     </a:p>
@@ -18871,7 +18871,7 @@
                     <a:p>
                       <a:pPr algn="ctr"/>
                       <a:r>
-                        <a:rPr lang="en-US" sz="1400" dirty="0"/>
+                        <a:rPr lang="en-US" sz="1400" b="1" dirty="0"/>
                         <a:t>cropland</a:t>
                       </a:r>
                     </a:p>
@@ -18899,7 +18899,7 @@
                     <a:p>
                       <a:pPr algn="ctr"/>
                       <a:r>
-                        <a:rPr lang="en-US" sz="1400" dirty="0"/>
+                        <a:rPr lang="en-US" sz="1400" b="1" dirty="0"/>
                         <a:t>AZ</a:t>
                       </a:r>
                     </a:p>
@@ -18927,7 +18927,7 @@
                     <a:p>
                       <a:pPr algn="ctr"/>
                       <a:r>
-                        <a:rPr lang="en-US" sz="1400" dirty="0"/>
+                        <a:rPr lang="en-US" sz="1400" b="1" dirty="0"/>
                         <a:t>grassland</a:t>
                       </a:r>
                     </a:p>
@@ -18962,7 +18962,7 @@
                     <a:p>
                       <a:pPr algn="ctr"/>
                       <a:r>
-                        <a:rPr lang="en-US" sz="1400" dirty="0"/>
+                        <a:rPr lang="en-US" sz="1400" b="1" dirty="0"/>
                         <a:t>bi</a:t>
                       </a:r>
                     </a:p>
@@ -18990,10 +18990,10 @@
                     <a:p>
                       <a:pPr algn="ctr"/>
                       <a:r>
-                        <a:rPr lang="en-US" sz="1400" dirty="0" err="1"/>
+                        <a:rPr lang="en-US" sz="1400" b="1" dirty="0" err="1"/>
                         <a:t>pop_dens</a:t>
                       </a:r>
-                      <a:endParaRPr lang="en-US" sz="1400" dirty="0"/>
+                      <a:endParaRPr lang="en-US" sz="1400" b="1" dirty="0"/>
                     </a:p>
                   </a:txBody>
                   <a:tcPr anchor="ctr"/>
@@ -19019,7 +19019,7 @@
                     <a:p>
                       <a:pPr algn="ctr"/>
                       <a:r>
-                        <a:rPr lang="en-US" sz="1400" dirty="0"/>
+                        <a:rPr lang="en-US" sz="1400" b="1" dirty="0"/>
                         <a:t>OR</a:t>
                       </a:r>
                     </a:p>
@@ -19047,7 +19047,7 @@
                     <a:p>
                       <a:pPr algn="ctr"/>
                       <a:r>
-                        <a:rPr lang="en-US" sz="1400" dirty="0"/>
+                        <a:rPr lang="en-US" sz="1400" b="1" dirty="0"/>
                         <a:t>smoking</a:t>
                       </a:r>
                     </a:p>
@@ -19183,13 +19183,8 @@
           <a:p>
             <a:r>
               <a:rPr lang="en-US" sz="2400" dirty="0"/>
-              <a:t>To avoid severe wildfires influences, we can have more restrictions on campfires, monitor weather more carefully, and have more precautious measures in </a:t>
-            </a:r>
-            <a:r>
-              <a:rPr lang="en-US" sz="2400"/>
-              <a:t>undeveloped areas.</a:t>
-            </a:r>
-            <a:endParaRPr lang="en-US" sz="2400" dirty="0"/>
+              <a:t>To avoid severe wildfires influences, we can have more restrictions on campfires, monitor weather more carefully, and have more precautious measures in undeveloped areas.</a:t>
+            </a:r>
           </a:p>
         </p:txBody>
       </p:sp>

</xml_diff>

<commit_message>
something forgot to commit
</commit_message>
<xml_diff>
--- a/slides.pptx
+++ b/slides.pptx
@@ -246,7 +246,7 @@
           <a:p>
             <a:fld id="{14D59018-6AF1-E143-86C9-CA28F167CE25}" type="datetimeFigureOut">
               <a:rPr lang="en-US" smtClean="0"/>
-              <a:t>12/5/2020</a:t>
+              <a:t>12/7/2020</a:t>
             </a:fld>
             <a:endParaRPr lang="en-US"/>
           </a:p>
@@ -513,6 +513,295 @@
 </p:notesMaster>
 </file>
 
+<file path=ppt/notesSlides/notesSlide1.xml><?xml version="1.0" encoding="utf-8"?>
+<p:notes xmlns:a="http://schemas.openxmlformats.org/drawingml/2006/main" xmlns:r="http://schemas.openxmlformats.org/officeDocument/2006/relationships" xmlns:p="http://schemas.openxmlformats.org/presentationml/2006/main">
+  <p:cSld>
+    <p:spTree>
+      <p:nvGrpSpPr>
+        <p:cNvPr id="1" name=""/>
+        <p:cNvGrpSpPr/>
+        <p:nvPr/>
+      </p:nvGrpSpPr>
+      <p:grpSpPr>
+        <a:xfrm>
+          <a:off x="0" y="0"/>
+          <a:ext cx="0" cy="0"/>
+          <a:chOff x="0" y="0"/>
+          <a:chExt cx="0" cy="0"/>
+        </a:xfrm>
+      </p:grpSpPr>
+      <p:sp>
+        <p:nvSpPr>
+          <p:cNvPr id="2" name="Slide Image Placeholder 1"/>
+          <p:cNvSpPr>
+            <a:spLocks noGrp="1" noRot="1" noChangeAspect="1"/>
+          </p:cNvSpPr>
+          <p:nvPr>
+            <p:ph type="sldImg"/>
+          </p:nvPr>
+        </p:nvSpPr>
+        <p:spPr/>
+      </p:sp>
+      <p:sp>
+        <p:nvSpPr>
+          <p:cNvPr id="3" name="Notes Placeholder 2"/>
+          <p:cNvSpPr>
+            <a:spLocks noGrp="1"/>
+          </p:cNvSpPr>
+          <p:nvPr>
+            <p:ph type="body" idx="1"/>
+          </p:nvPr>
+        </p:nvSpPr>
+        <p:spPr/>
+        <p:txBody>
+          <a:bodyPr/>
+          <a:lstStyle/>
+          <a:p>
+            <a:r>
+              <a:rPr lang="en-US" dirty="0"/>
+              <a:t>BI: index related to the efforts to contain fire</a:t>
+            </a:r>
+          </a:p>
+        </p:txBody>
+      </p:sp>
+      <p:sp>
+        <p:nvSpPr>
+          <p:cNvPr id="4" name="Slide Number Placeholder 3"/>
+          <p:cNvSpPr>
+            <a:spLocks noGrp="1"/>
+          </p:cNvSpPr>
+          <p:nvPr>
+            <p:ph type="sldNum" sz="quarter" idx="5"/>
+          </p:nvPr>
+        </p:nvSpPr>
+        <p:spPr/>
+        <p:txBody>
+          <a:bodyPr/>
+          <a:lstStyle/>
+          <a:p>
+            <a:fld id="{4B1BE1EE-CD29-2047-8800-BBF04764B399}" type="slidenum">
+              <a:rPr lang="en-US" smtClean="0"/>
+              <a:t>3</a:t>
+            </a:fld>
+            <a:endParaRPr lang="en-US"/>
+          </a:p>
+        </p:txBody>
+      </p:sp>
+    </p:spTree>
+    <p:extLst>
+      <p:ext uri="{BB962C8B-B14F-4D97-AF65-F5344CB8AC3E}">
+        <p14:creationId xmlns:p14="http://schemas.microsoft.com/office/powerpoint/2010/main" val="1246637754"/>
+      </p:ext>
+    </p:extLst>
+  </p:cSld>
+  <p:clrMapOvr>
+    <a:masterClrMapping/>
+  </p:clrMapOvr>
+</p:notes>
+</file>
+
+<file path=ppt/notesSlides/notesSlide2.xml><?xml version="1.0" encoding="utf-8"?>
+<p:notes xmlns:a="http://schemas.openxmlformats.org/drawingml/2006/main" xmlns:r="http://schemas.openxmlformats.org/officeDocument/2006/relationships" xmlns:p="http://schemas.openxmlformats.org/presentationml/2006/main">
+  <p:cSld>
+    <p:spTree>
+      <p:nvGrpSpPr>
+        <p:cNvPr id="1" name=""/>
+        <p:cNvGrpSpPr/>
+        <p:nvPr/>
+      </p:nvGrpSpPr>
+      <p:grpSpPr>
+        <a:xfrm>
+          <a:off x="0" y="0"/>
+          <a:ext cx="0" cy="0"/>
+          <a:chOff x="0" y="0"/>
+          <a:chExt cx="0" cy="0"/>
+        </a:xfrm>
+      </p:grpSpPr>
+      <p:sp>
+        <p:nvSpPr>
+          <p:cNvPr id="2" name="Slide Image Placeholder 1"/>
+          <p:cNvSpPr>
+            <a:spLocks noGrp="1" noRot="1" noChangeAspect="1"/>
+          </p:cNvSpPr>
+          <p:nvPr>
+            <p:ph type="sldImg"/>
+          </p:nvPr>
+        </p:nvSpPr>
+        <p:spPr/>
+      </p:sp>
+      <p:sp>
+        <p:nvSpPr>
+          <p:cNvPr id="3" name="Notes Placeholder 2"/>
+          <p:cNvSpPr>
+            <a:spLocks noGrp="1"/>
+          </p:cNvSpPr>
+          <p:nvPr>
+            <p:ph type="body" idx="1"/>
+          </p:nvPr>
+        </p:nvSpPr>
+        <p:spPr/>
+        <p:txBody>
+          <a:bodyPr/>
+          <a:lstStyle/>
+          <a:p>
+            <a:r>
+              <a:rPr lang="en-US" dirty="0"/>
+              <a:t>Check feature redundancy after merging data</a:t>
+            </a:r>
+          </a:p>
+        </p:txBody>
+      </p:sp>
+      <p:sp>
+        <p:nvSpPr>
+          <p:cNvPr id="4" name="Slide Number Placeholder 3"/>
+          <p:cNvSpPr>
+            <a:spLocks noGrp="1"/>
+          </p:cNvSpPr>
+          <p:nvPr>
+            <p:ph type="sldNum" sz="quarter" idx="5"/>
+          </p:nvPr>
+        </p:nvSpPr>
+        <p:spPr/>
+        <p:txBody>
+          <a:bodyPr/>
+          <a:lstStyle/>
+          <a:p>
+            <a:fld id="{4B1BE1EE-CD29-2047-8800-BBF04764B399}" type="slidenum">
+              <a:rPr lang="en-US" smtClean="0"/>
+              <a:t>5</a:t>
+            </a:fld>
+            <a:endParaRPr lang="en-US"/>
+          </a:p>
+        </p:txBody>
+      </p:sp>
+    </p:spTree>
+    <p:extLst>
+      <p:ext uri="{BB962C8B-B14F-4D97-AF65-F5344CB8AC3E}">
+        <p14:creationId xmlns:p14="http://schemas.microsoft.com/office/powerpoint/2010/main" val="2423072964"/>
+      </p:ext>
+    </p:extLst>
+  </p:cSld>
+  <p:clrMapOvr>
+    <a:masterClrMapping/>
+  </p:clrMapOvr>
+</p:notes>
+</file>
+
+<file path=ppt/notesSlides/notesSlide3.xml><?xml version="1.0" encoding="utf-8"?>
+<p:notes xmlns:a="http://schemas.openxmlformats.org/drawingml/2006/main" xmlns:r="http://schemas.openxmlformats.org/officeDocument/2006/relationships" xmlns:p="http://schemas.openxmlformats.org/presentationml/2006/main">
+  <p:cSld>
+    <p:spTree>
+      <p:nvGrpSpPr>
+        <p:cNvPr id="1" name=""/>
+        <p:cNvGrpSpPr/>
+        <p:nvPr/>
+      </p:nvGrpSpPr>
+      <p:grpSpPr>
+        <a:xfrm>
+          <a:off x="0" y="0"/>
+          <a:ext cx="0" cy="0"/>
+          <a:chOff x="0" y="0"/>
+          <a:chExt cx="0" cy="0"/>
+        </a:xfrm>
+      </p:grpSpPr>
+      <p:sp>
+        <p:nvSpPr>
+          <p:cNvPr id="2" name="Slide Image Placeholder 1"/>
+          <p:cNvSpPr>
+            <a:spLocks noGrp="1" noRot="1" noChangeAspect="1"/>
+          </p:cNvSpPr>
+          <p:nvPr>
+            <p:ph type="sldImg"/>
+          </p:nvPr>
+        </p:nvSpPr>
+        <p:spPr/>
+      </p:sp>
+      <p:sp>
+        <p:nvSpPr>
+          <p:cNvPr id="3" name="Notes Placeholder 2"/>
+          <p:cNvSpPr>
+            <a:spLocks noGrp="1"/>
+          </p:cNvSpPr>
+          <p:nvPr>
+            <p:ph type="body" idx="1"/>
+          </p:nvPr>
+        </p:nvSpPr>
+        <p:spPr/>
+        <p:txBody>
+          <a:bodyPr/>
+          <a:lstStyle/>
+          <a:p>
+            <a:r>
+              <a:rPr lang="en-US" dirty="0"/>
+              <a:t>1. Use decision tree because it is easier to interpret the model, good at irrelevant feature and outliers; random forest and </a:t>
+            </a:r>
+            <a:r>
+              <a:rPr lang="en-US" dirty="0" err="1"/>
+              <a:t>xgboost</a:t>
+            </a:r>
+            <a:r>
+              <a:rPr lang="en-US" dirty="0"/>
+              <a:t> can help to increase classification accuracy; </a:t>
+            </a:r>
+          </a:p>
+          <a:p>
+            <a:r>
+              <a:rPr lang="en-US" dirty="0"/>
+              <a:t>2. random forest can handle high dimension data better than the other models, good at unbalanced data</a:t>
+            </a:r>
+          </a:p>
+          <a:p>
+            <a:r>
+              <a:rPr lang="en-US" dirty="0"/>
+              <a:t>3. </a:t>
+            </a:r>
+            <a:r>
+              <a:rPr lang="en-US" dirty="0" err="1"/>
+              <a:t>xgboost</a:t>
+            </a:r>
+            <a:r>
+              <a:rPr lang="en-US" dirty="0"/>
+              <a:t> can reach a higher accuracy.</a:t>
+            </a:r>
+          </a:p>
+        </p:txBody>
+      </p:sp>
+      <p:sp>
+        <p:nvSpPr>
+          <p:cNvPr id="4" name="Slide Number Placeholder 3"/>
+          <p:cNvSpPr>
+            <a:spLocks noGrp="1"/>
+          </p:cNvSpPr>
+          <p:nvPr>
+            <p:ph type="sldNum" sz="quarter" idx="5"/>
+          </p:nvPr>
+        </p:nvSpPr>
+        <p:spPr/>
+        <p:txBody>
+          <a:bodyPr/>
+          <a:lstStyle/>
+          <a:p>
+            <a:fld id="{4B1BE1EE-CD29-2047-8800-BBF04764B399}" type="slidenum">
+              <a:rPr lang="en-US" smtClean="0"/>
+              <a:t>6</a:t>
+            </a:fld>
+            <a:endParaRPr lang="en-US"/>
+          </a:p>
+        </p:txBody>
+      </p:sp>
+    </p:spTree>
+    <p:extLst>
+      <p:ext uri="{BB962C8B-B14F-4D97-AF65-F5344CB8AC3E}">
+        <p14:creationId xmlns:p14="http://schemas.microsoft.com/office/powerpoint/2010/main" val="20841626"/>
+      </p:ext>
+    </p:extLst>
+  </p:cSld>
+  <p:clrMapOvr>
+    <a:masterClrMapping/>
+  </p:clrMapOvr>
+</p:notes>
+</file>
+
 <file path=ppt/slideLayouts/slideLayout1.xml><?xml version="1.0" encoding="utf-8"?>
 <p:sldLayout xmlns:a="http://schemas.openxmlformats.org/drawingml/2006/main" xmlns:r="http://schemas.openxmlformats.org/officeDocument/2006/relationships" xmlns:p="http://schemas.openxmlformats.org/presentationml/2006/main" preserve="1" userDrawn="1">
   <p:cSld name="Title Slide">
@@ -774,7 +1063,7 @@
           <a:p>
             <a:fld id="{9C729E5C-3CB6-F744-AF51-17F6E760A207}" type="datetimeFigureOut">
               <a:rPr lang="en-US" smtClean="0"/>
-              <a:t>12/5/2020</a:t>
+              <a:t>12/7/2020</a:t>
             </a:fld>
             <a:endParaRPr lang="en-US"/>
           </a:p>
@@ -956,7 +1245,7 @@
           <a:p>
             <a:fld id="{9C729E5C-3CB6-F744-AF51-17F6E760A207}" type="datetimeFigureOut">
               <a:rPr lang="en-US" smtClean="0"/>
-              <a:t>12/5/2020</a:t>
+              <a:t>12/7/2020</a:t>
             </a:fld>
             <a:endParaRPr lang="en-US"/>
           </a:p>
@@ -1136,7 +1425,7 @@
           <a:p>
             <a:fld id="{9C729E5C-3CB6-F744-AF51-17F6E760A207}" type="datetimeFigureOut">
               <a:rPr lang="en-US" smtClean="0"/>
-              <a:t>12/5/2020</a:t>
+              <a:t>12/7/2020</a:t>
             </a:fld>
             <a:endParaRPr lang="en-US"/>
           </a:p>
@@ -1376,7 +1665,7 @@
           <a:p>
             <a:fld id="{80AB63A9-DDF0-F44C-8B6A-263F00DFB10C}" type="datetimeFigureOut">
               <a:rPr lang="en-US" smtClean="0"/>
-              <a:t>12/5/2020</a:t>
+              <a:t>12/7/2020</a:t>
             </a:fld>
             <a:endParaRPr lang="en-US"/>
           </a:p>
@@ -1544,7 +1833,7 @@
           <a:p>
             <a:fld id="{80AB63A9-DDF0-F44C-8B6A-263F00DFB10C}" type="datetimeFigureOut">
               <a:rPr lang="en-US" smtClean="0"/>
-              <a:t>12/5/2020</a:t>
+              <a:t>12/7/2020</a:t>
             </a:fld>
             <a:endParaRPr lang="en-US"/>
           </a:p>
@@ -1789,7 +2078,7 @@
           <a:p>
             <a:fld id="{80AB63A9-DDF0-F44C-8B6A-263F00DFB10C}" type="datetimeFigureOut">
               <a:rPr lang="en-US" smtClean="0"/>
-              <a:t>12/5/2020</a:t>
+              <a:t>12/7/2020</a:t>
             </a:fld>
             <a:endParaRPr lang="en-US"/>
           </a:p>
@@ -2074,7 +2363,7 @@
           <a:p>
             <a:fld id="{80AB63A9-DDF0-F44C-8B6A-263F00DFB10C}" type="datetimeFigureOut">
               <a:rPr lang="en-US" smtClean="0"/>
-              <a:t>12/5/2020</a:t>
+              <a:t>12/7/2020</a:t>
             </a:fld>
             <a:endParaRPr lang="en-US"/>
           </a:p>
@@ -2493,7 +2782,7 @@
           <a:p>
             <a:fld id="{80AB63A9-DDF0-F44C-8B6A-263F00DFB10C}" type="datetimeFigureOut">
               <a:rPr lang="en-US" smtClean="0"/>
-              <a:t>12/5/2020</a:t>
+              <a:t>12/7/2020</a:t>
             </a:fld>
             <a:endParaRPr lang="en-US"/>
           </a:p>
@@ -2610,7 +2899,7 @@
           <a:p>
             <a:fld id="{80AB63A9-DDF0-F44C-8B6A-263F00DFB10C}" type="datetimeFigureOut">
               <a:rPr lang="en-US" smtClean="0"/>
-              <a:t>12/5/2020</a:t>
+              <a:t>12/7/2020</a:t>
             </a:fld>
             <a:endParaRPr lang="en-US"/>
           </a:p>
@@ -2705,7 +2994,7 @@
           <a:p>
             <a:fld id="{80AB63A9-DDF0-F44C-8B6A-263F00DFB10C}" type="datetimeFigureOut">
               <a:rPr lang="en-US" smtClean="0"/>
-              <a:t>12/5/2020</a:t>
+              <a:t>12/7/2020</a:t>
             </a:fld>
             <a:endParaRPr lang="en-US"/>
           </a:p>
@@ -2980,7 +3269,7 @@
           <a:p>
             <a:fld id="{80AB63A9-DDF0-F44C-8B6A-263F00DFB10C}" type="datetimeFigureOut">
               <a:rPr lang="en-US" smtClean="0"/>
-              <a:t>12/5/2020</a:t>
+              <a:t>12/7/2020</a:t>
             </a:fld>
             <a:endParaRPr lang="en-US"/>
           </a:p>
@@ -3149,7 +3438,7 @@
           <a:p>
             <a:fld id="{9C729E5C-3CB6-F744-AF51-17F6E760A207}" type="datetimeFigureOut">
               <a:rPr lang="en-US" smtClean="0"/>
-              <a:t>12/5/2020</a:t>
+              <a:t>12/7/2020</a:t>
             </a:fld>
             <a:endParaRPr lang="en-US"/>
           </a:p>
@@ -3401,7 +3690,7 @@
           <a:p>
             <a:fld id="{80AB63A9-DDF0-F44C-8B6A-263F00DFB10C}" type="datetimeFigureOut">
               <a:rPr lang="en-US" smtClean="0"/>
-              <a:t>12/5/2020</a:t>
+              <a:t>12/7/2020</a:t>
             </a:fld>
             <a:endParaRPr lang="en-US"/>
           </a:p>
@@ -3569,7 +3858,7 @@
           <a:p>
             <a:fld id="{80AB63A9-DDF0-F44C-8B6A-263F00DFB10C}" type="datetimeFigureOut">
               <a:rPr lang="en-US" smtClean="0"/>
-              <a:t>12/5/2020</a:t>
+              <a:t>12/7/2020</a:t>
             </a:fld>
             <a:endParaRPr lang="en-US"/>
           </a:p>
@@ -3747,7 +4036,7 @@
           <a:p>
             <a:fld id="{80AB63A9-DDF0-F44C-8B6A-263F00DFB10C}" type="datetimeFigureOut">
               <a:rPr lang="en-US" smtClean="0"/>
-              <a:t>12/5/2020</a:t>
+              <a:t>12/7/2020</a:t>
             </a:fld>
             <a:endParaRPr lang="en-US"/>
           </a:p>
@@ -3987,7 +4276,7 @@
           <a:p>
             <a:fld id="{840799DD-6023-CA40-A56A-FFABB179F54E}" type="datetimeFigureOut">
               <a:rPr lang="en-US" smtClean="0"/>
-              <a:t>12/5/2020</a:t>
+              <a:t>12/7/2020</a:t>
             </a:fld>
             <a:endParaRPr lang="en-US"/>
           </a:p>
@@ -4155,7 +4444,7 @@
           <a:p>
             <a:fld id="{840799DD-6023-CA40-A56A-FFABB179F54E}" type="datetimeFigureOut">
               <a:rPr lang="en-US" smtClean="0"/>
-              <a:t>12/5/2020</a:t>
+              <a:t>12/7/2020</a:t>
             </a:fld>
             <a:endParaRPr lang="en-US"/>
           </a:p>
@@ -4400,7 +4689,7 @@
           <a:p>
             <a:fld id="{840799DD-6023-CA40-A56A-FFABB179F54E}" type="datetimeFigureOut">
               <a:rPr lang="en-US" smtClean="0"/>
-              <a:t>12/5/2020</a:t>
+              <a:t>12/7/2020</a:t>
             </a:fld>
             <a:endParaRPr lang="en-US"/>
           </a:p>
@@ -4685,7 +4974,7 @@
           <a:p>
             <a:fld id="{840799DD-6023-CA40-A56A-FFABB179F54E}" type="datetimeFigureOut">
               <a:rPr lang="en-US" smtClean="0"/>
-              <a:t>12/5/2020</a:t>
+              <a:t>12/7/2020</a:t>
             </a:fld>
             <a:endParaRPr lang="en-US"/>
           </a:p>
@@ -5104,7 +5393,7 @@
           <a:p>
             <a:fld id="{840799DD-6023-CA40-A56A-FFABB179F54E}" type="datetimeFigureOut">
               <a:rPr lang="en-US" smtClean="0"/>
-              <a:t>12/5/2020</a:t>
+              <a:t>12/7/2020</a:t>
             </a:fld>
             <a:endParaRPr lang="en-US"/>
           </a:p>
@@ -5221,7 +5510,7 @@
           <a:p>
             <a:fld id="{840799DD-6023-CA40-A56A-FFABB179F54E}" type="datetimeFigureOut">
               <a:rPr lang="en-US" smtClean="0"/>
-              <a:t>12/5/2020</a:t>
+              <a:t>12/7/2020</a:t>
             </a:fld>
             <a:endParaRPr lang="en-US"/>
           </a:p>
@@ -5316,7 +5605,7 @@
           <a:p>
             <a:fld id="{840799DD-6023-CA40-A56A-FFABB179F54E}" type="datetimeFigureOut">
               <a:rPr lang="en-US" smtClean="0"/>
-              <a:t>12/5/2020</a:t>
+              <a:t>12/7/2020</a:t>
             </a:fld>
             <a:endParaRPr lang="en-US"/>
           </a:p>
@@ -5561,7 +5850,7 @@
           <a:p>
             <a:fld id="{9C729E5C-3CB6-F744-AF51-17F6E760A207}" type="datetimeFigureOut">
               <a:rPr lang="en-US" smtClean="0"/>
-              <a:t>12/5/2020</a:t>
+              <a:t>12/7/2020</a:t>
             </a:fld>
             <a:endParaRPr lang="en-US"/>
           </a:p>
@@ -5864,7 +6153,7 @@
           <a:p>
             <a:fld id="{840799DD-6023-CA40-A56A-FFABB179F54E}" type="datetimeFigureOut">
               <a:rPr lang="en-US" smtClean="0"/>
-              <a:t>12/5/2020</a:t>
+              <a:t>12/7/2020</a:t>
             </a:fld>
             <a:endParaRPr lang="en-US"/>
           </a:p>
@@ -6116,7 +6405,7 @@
           <a:p>
             <a:fld id="{840799DD-6023-CA40-A56A-FFABB179F54E}" type="datetimeFigureOut">
               <a:rPr lang="en-US" smtClean="0"/>
-              <a:t>12/5/2020</a:t>
+              <a:t>12/7/2020</a:t>
             </a:fld>
             <a:endParaRPr lang="en-US"/>
           </a:p>
@@ -6284,7 +6573,7 @@
           <a:p>
             <a:fld id="{840799DD-6023-CA40-A56A-FFABB179F54E}" type="datetimeFigureOut">
               <a:rPr lang="en-US" smtClean="0"/>
-              <a:t>12/5/2020</a:t>
+              <a:t>12/7/2020</a:t>
             </a:fld>
             <a:endParaRPr lang="en-US"/>
           </a:p>
@@ -6462,7 +6751,7 @@
           <a:p>
             <a:fld id="{840799DD-6023-CA40-A56A-FFABB179F54E}" type="datetimeFigureOut">
               <a:rPr lang="en-US" smtClean="0"/>
-              <a:t>12/5/2020</a:t>
+              <a:t>12/7/2020</a:t>
             </a:fld>
             <a:endParaRPr lang="en-US"/>
           </a:p>
@@ -6702,7 +6991,7 @@
           <a:p>
             <a:fld id="{E3DD0234-BC12-BE42-88BE-92A199E146BB}" type="datetimeFigureOut">
               <a:rPr lang="en-US" smtClean="0"/>
-              <a:t>12/5/2020</a:t>
+              <a:t>12/7/2020</a:t>
             </a:fld>
             <a:endParaRPr lang="en-US"/>
           </a:p>
@@ -6870,7 +7159,7 @@
           <a:p>
             <a:fld id="{E3DD0234-BC12-BE42-88BE-92A199E146BB}" type="datetimeFigureOut">
               <a:rPr lang="en-US" smtClean="0"/>
-              <a:t>12/5/2020</a:t>
+              <a:t>12/7/2020</a:t>
             </a:fld>
             <a:endParaRPr lang="en-US"/>
           </a:p>
@@ -7115,7 +7404,7 @@
           <a:p>
             <a:fld id="{E3DD0234-BC12-BE42-88BE-92A199E146BB}" type="datetimeFigureOut">
               <a:rPr lang="en-US" smtClean="0"/>
-              <a:t>12/5/2020</a:t>
+              <a:t>12/7/2020</a:t>
             </a:fld>
             <a:endParaRPr lang="en-US"/>
           </a:p>
@@ -7400,7 +7689,7 @@
           <a:p>
             <a:fld id="{E3DD0234-BC12-BE42-88BE-92A199E146BB}" type="datetimeFigureOut">
               <a:rPr lang="en-US" smtClean="0"/>
-              <a:t>12/5/2020</a:t>
+              <a:t>12/7/2020</a:t>
             </a:fld>
             <a:endParaRPr lang="en-US"/>
           </a:p>
@@ -7819,7 +8108,7 @@
           <a:p>
             <a:fld id="{E3DD0234-BC12-BE42-88BE-92A199E146BB}" type="datetimeFigureOut">
               <a:rPr lang="en-US" smtClean="0"/>
-              <a:t>12/5/2020</a:t>
+              <a:t>12/7/2020</a:t>
             </a:fld>
             <a:endParaRPr lang="en-US"/>
           </a:p>
@@ -7936,7 +8225,7 @@
           <a:p>
             <a:fld id="{E3DD0234-BC12-BE42-88BE-92A199E146BB}" type="datetimeFigureOut">
               <a:rPr lang="en-US" smtClean="0"/>
-              <a:t>12/5/2020</a:t>
+              <a:t>12/7/2020</a:t>
             </a:fld>
             <a:endParaRPr lang="en-US"/>
           </a:p>
@@ -8167,7 +8456,7 @@
           <a:p>
             <a:fld id="{9C729E5C-3CB6-F744-AF51-17F6E760A207}" type="datetimeFigureOut">
               <a:rPr lang="en-US" smtClean="0"/>
-              <a:t>12/5/2020</a:t>
+              <a:t>12/7/2020</a:t>
             </a:fld>
             <a:endParaRPr lang="en-US"/>
           </a:p>
@@ -8262,7 +8551,7 @@
           <a:p>
             <a:fld id="{E3DD0234-BC12-BE42-88BE-92A199E146BB}" type="datetimeFigureOut">
               <a:rPr lang="en-US" smtClean="0"/>
-              <a:t>12/5/2020</a:t>
+              <a:t>12/7/2020</a:t>
             </a:fld>
             <a:endParaRPr lang="en-US"/>
           </a:p>
@@ -8537,7 +8826,7 @@
           <a:p>
             <a:fld id="{E3DD0234-BC12-BE42-88BE-92A199E146BB}" type="datetimeFigureOut">
               <a:rPr lang="en-US" smtClean="0"/>
-              <a:t>12/5/2020</a:t>
+              <a:t>12/7/2020</a:t>
             </a:fld>
             <a:endParaRPr lang="en-US"/>
           </a:p>
@@ -8789,7 +9078,7 @@
           <a:p>
             <a:fld id="{E3DD0234-BC12-BE42-88BE-92A199E146BB}" type="datetimeFigureOut">
               <a:rPr lang="en-US" smtClean="0"/>
-              <a:t>12/5/2020</a:t>
+              <a:t>12/7/2020</a:t>
             </a:fld>
             <a:endParaRPr lang="en-US"/>
           </a:p>
@@ -8957,7 +9246,7 @@
           <a:p>
             <a:fld id="{E3DD0234-BC12-BE42-88BE-92A199E146BB}" type="datetimeFigureOut">
               <a:rPr lang="en-US" smtClean="0"/>
-              <a:t>12/5/2020</a:t>
+              <a:t>12/7/2020</a:t>
             </a:fld>
             <a:endParaRPr lang="en-US"/>
           </a:p>
@@ -9135,7 +9424,7 @@
           <a:p>
             <a:fld id="{E3DD0234-BC12-BE42-88BE-92A199E146BB}" type="datetimeFigureOut">
               <a:rPr lang="en-US" smtClean="0"/>
-              <a:t>12/5/2020</a:t>
+              <a:t>12/7/2020</a:t>
             </a:fld>
             <a:endParaRPr lang="en-US"/>
           </a:p>
@@ -9375,7 +9664,7 @@
           <a:p>
             <a:fld id="{D8AAD7F8-53C5-3641-8148-7D47216075EF}" type="datetimeFigureOut">
               <a:rPr lang="en-US" smtClean="0"/>
-              <a:t>12/5/2020</a:t>
+              <a:t>12/7/2020</a:t>
             </a:fld>
             <a:endParaRPr lang="en-US"/>
           </a:p>
@@ -9543,7 +9832,7 @@
           <a:p>
             <a:fld id="{D8AAD7F8-53C5-3641-8148-7D47216075EF}" type="datetimeFigureOut">
               <a:rPr lang="en-US" smtClean="0"/>
-              <a:t>12/5/2020</a:t>
+              <a:t>12/7/2020</a:t>
             </a:fld>
             <a:endParaRPr lang="en-US"/>
           </a:p>
@@ -9788,7 +10077,7 @@
           <a:p>
             <a:fld id="{D8AAD7F8-53C5-3641-8148-7D47216075EF}" type="datetimeFigureOut">
               <a:rPr lang="en-US" smtClean="0"/>
-              <a:t>12/5/2020</a:t>
+              <a:t>12/7/2020</a:t>
             </a:fld>
             <a:endParaRPr lang="en-US"/>
           </a:p>
@@ -10073,7 +10362,7 @@
           <a:p>
             <a:fld id="{D8AAD7F8-53C5-3641-8148-7D47216075EF}" type="datetimeFigureOut">
               <a:rPr lang="en-US" smtClean="0"/>
-              <a:t>12/5/2020</a:t>
+              <a:t>12/7/2020</a:t>
             </a:fld>
             <a:endParaRPr lang="en-US"/>
           </a:p>
@@ -10492,7 +10781,7 @@
           <a:p>
             <a:fld id="{D8AAD7F8-53C5-3641-8148-7D47216075EF}" type="datetimeFigureOut">
               <a:rPr lang="en-US" smtClean="0"/>
-              <a:t>12/5/2020</a:t>
+              <a:t>12/7/2020</a:t>
             </a:fld>
             <a:endParaRPr lang="en-US"/>
           </a:p>
@@ -10858,7 +11147,7 @@
           <a:p>
             <a:fld id="{9C729E5C-3CB6-F744-AF51-17F6E760A207}" type="datetimeFigureOut">
               <a:rPr lang="en-US" smtClean="0"/>
-              <a:t>12/5/2020</a:t>
+              <a:t>12/7/2020</a:t>
             </a:fld>
             <a:endParaRPr lang="en-US"/>
           </a:p>
@@ -10975,7 +11264,7 @@
           <a:p>
             <a:fld id="{D8AAD7F8-53C5-3641-8148-7D47216075EF}" type="datetimeFigureOut">
               <a:rPr lang="en-US" smtClean="0"/>
-              <a:t>12/5/2020</a:t>
+              <a:t>12/7/2020</a:t>
             </a:fld>
             <a:endParaRPr lang="en-US"/>
           </a:p>
@@ -11070,7 +11359,7 @@
           <a:p>
             <a:fld id="{D8AAD7F8-53C5-3641-8148-7D47216075EF}" type="datetimeFigureOut">
               <a:rPr lang="en-US" smtClean="0"/>
-              <a:t>12/5/2020</a:t>
+              <a:t>12/7/2020</a:t>
             </a:fld>
             <a:endParaRPr lang="en-US"/>
           </a:p>
@@ -11345,7 +11634,7 @@
           <a:p>
             <a:fld id="{D8AAD7F8-53C5-3641-8148-7D47216075EF}" type="datetimeFigureOut">
               <a:rPr lang="en-US" smtClean="0"/>
-              <a:t>12/5/2020</a:t>
+              <a:t>12/7/2020</a:t>
             </a:fld>
             <a:endParaRPr lang="en-US"/>
           </a:p>
@@ -11597,7 +11886,7 @@
           <a:p>
             <a:fld id="{D8AAD7F8-53C5-3641-8148-7D47216075EF}" type="datetimeFigureOut">
               <a:rPr lang="en-US" smtClean="0"/>
-              <a:t>12/5/2020</a:t>
+              <a:t>12/7/2020</a:t>
             </a:fld>
             <a:endParaRPr lang="en-US"/>
           </a:p>
@@ -11765,7 +12054,7 @@
           <a:p>
             <a:fld id="{D8AAD7F8-53C5-3641-8148-7D47216075EF}" type="datetimeFigureOut">
               <a:rPr lang="en-US" smtClean="0"/>
-              <a:t>12/5/2020</a:t>
+              <a:t>12/7/2020</a:t>
             </a:fld>
             <a:endParaRPr lang="en-US"/>
           </a:p>
@@ -11943,7 +12232,7 @@
           <a:p>
             <a:fld id="{D8AAD7F8-53C5-3641-8148-7D47216075EF}" type="datetimeFigureOut">
               <a:rPr lang="en-US" smtClean="0"/>
-              <a:t>12/5/2020</a:t>
+              <a:t>12/7/2020</a:t>
             </a:fld>
             <a:endParaRPr lang="en-US"/>
           </a:p>
@@ -12060,7 +12349,7 @@
           <a:p>
             <a:fld id="{9C729E5C-3CB6-F744-AF51-17F6E760A207}" type="datetimeFigureOut">
               <a:rPr lang="en-US" smtClean="0"/>
-              <a:t>12/5/2020</a:t>
+              <a:t>12/7/2020</a:t>
             </a:fld>
             <a:endParaRPr lang="en-US"/>
           </a:p>
@@ -12366,7 +12655,7 @@
           <a:p>
             <a:fld id="{9C729E5C-3CB6-F744-AF51-17F6E760A207}" type="datetimeFigureOut">
               <a:rPr lang="en-US" smtClean="0"/>
-              <a:t>12/5/2020</a:t>
+              <a:t>12/7/2020</a:t>
             </a:fld>
             <a:endParaRPr lang="en-US"/>
           </a:p>
@@ -12623,7 +12912,7 @@
           <a:p>
             <a:fld id="{9C729E5C-3CB6-F744-AF51-17F6E760A207}" type="datetimeFigureOut">
               <a:rPr lang="en-US" smtClean="0"/>
-              <a:t>12/5/2020</a:t>
+              <a:t>12/7/2020</a:t>
             </a:fld>
             <a:endParaRPr lang="en-US"/>
           </a:p>
@@ -12835,7 +13124,7 @@
           <a:p>
             <a:fld id="{9C729E5C-3CB6-F744-AF51-17F6E760A207}" type="datetimeFigureOut">
               <a:rPr lang="en-US" smtClean="0"/>
-              <a:t>12/5/2020</a:t>
+              <a:t>12/7/2020</a:t>
             </a:fld>
             <a:endParaRPr lang="en-US"/>
           </a:p>
@@ -13511,7 +13800,7 @@
           <a:p>
             <a:fld id="{80AB63A9-DDF0-F44C-8B6A-263F00DFB10C}" type="datetimeFigureOut">
               <a:rPr lang="en-US" smtClean="0"/>
-              <a:t>12/5/2020</a:t>
+              <a:t>12/7/2020</a:t>
             </a:fld>
             <a:endParaRPr lang="en-US"/>
           </a:p>
@@ -14019,7 +14308,7 @@
           <a:p>
             <a:fld id="{840799DD-6023-CA40-A56A-FFABB179F54E}" type="datetimeFigureOut">
               <a:rPr lang="en-US" smtClean="0"/>
-              <a:t>12/5/2020</a:t>
+              <a:t>12/7/2020</a:t>
             </a:fld>
             <a:endParaRPr lang="en-US"/>
           </a:p>
@@ -14527,7 +14816,7 @@
           <a:p>
             <a:fld id="{E3DD0234-BC12-BE42-88BE-92A199E146BB}" type="datetimeFigureOut">
               <a:rPr lang="en-US" smtClean="0"/>
-              <a:t>12/5/2020</a:t>
+              <a:t>12/7/2020</a:t>
             </a:fld>
             <a:endParaRPr lang="en-US"/>
           </a:p>
@@ -15035,7 +15324,7 @@
           <a:p>
             <a:fld id="{D8AAD7F8-53C5-3641-8148-7D47216075EF}" type="datetimeFigureOut">
               <a:rPr lang="en-US" smtClean="0"/>
-              <a:t>12/5/2020</a:t>
+              <a:t>12/7/2020</a:t>
             </a:fld>
             <a:endParaRPr lang="en-US"/>
           </a:p>
@@ -15886,7 +16175,7 @@
           <p:nvPr/>
         </p:nvPicPr>
         <p:blipFill>
-          <a:blip r:embed="rId2"/>
+          <a:blip r:embed="rId3"/>
           <a:stretch>
             <a:fillRect/>
           </a:stretch>
@@ -15916,7 +16205,7 @@
           <p:nvPr/>
         </p:nvPicPr>
         <p:blipFill>
-          <a:blip r:embed="rId3"/>
+          <a:blip r:embed="rId4"/>
           <a:stretch>
             <a:fillRect/>
           </a:stretch>
@@ -16300,7 +16589,7 @@
           <p:nvPr/>
         </p:nvPicPr>
         <p:blipFill>
-          <a:blip r:embed="rId2"/>
+          <a:blip r:embed="rId3"/>
           <a:stretch>
             <a:fillRect/>
           </a:stretch>

</xml_diff>